<commit_message>
File Add, Script Making
</commit_message>
<xml_diff>
--- a/Assets/PROJECT UST/Anothers/ppt.pptx
+++ b/Assets/PROJECT UST/Anothers/ppt.pptx
@@ -6,8 +6,10 @@
   </p:sldMasterIdLst>
   <p:sldIdLst>
     <p:sldId id="256" r:id="rId2"/>
-    <p:sldId id="257" r:id="rId3"/>
-    <p:sldId id="258" r:id="rId4"/>
+    <p:sldId id="260" r:id="rId3"/>
+    <p:sldId id="257" r:id="rId4"/>
+    <p:sldId id="258" r:id="rId5"/>
+    <p:sldId id="259" r:id="rId6"/>
   </p:sldIdLst>
   <p:sldSz cx="12192000" cy="6858000"/>
   <p:notesSz cx="6858000" cy="9144000"/>
@@ -106,6 +108,11 @@
       </a:defRPr>
     </a:lvl9pPr>
   </p:defaultTextStyle>
+  <p:extLst>
+    <p:ext uri="{EFAFB233-063F-42B5-8137-9DF3F51BA10A}">
+      <p15:sldGuideLst xmlns:p15="http://schemas.microsoft.com/office/powerpoint/2012/main"/>
+    </p:ext>
+  </p:extLst>
 </p:presentation>
 </file>
 
@@ -256,7 +263,7 @@
           <a:p>
             <a:fld id="{CBBE7988-A085-420D-9970-887AD34DCC02}" type="datetimeFigureOut">
               <a:rPr lang="ko-KR" altLang="en-US" smtClean="0"/>
-              <a:t>2024-06-10</a:t>
+              <a:t>2024-06-12</a:t>
             </a:fld>
             <a:endParaRPr lang="ko-KR" altLang="en-US"/>
           </a:p>
@@ -454,7 +461,7 @@
           <a:p>
             <a:fld id="{CBBE7988-A085-420D-9970-887AD34DCC02}" type="datetimeFigureOut">
               <a:rPr lang="ko-KR" altLang="en-US" smtClean="0"/>
-              <a:t>2024-06-10</a:t>
+              <a:t>2024-06-12</a:t>
             </a:fld>
             <a:endParaRPr lang="ko-KR" altLang="en-US"/>
           </a:p>
@@ -662,7 +669,7 @@
           <a:p>
             <a:fld id="{CBBE7988-A085-420D-9970-887AD34DCC02}" type="datetimeFigureOut">
               <a:rPr lang="ko-KR" altLang="en-US" smtClean="0"/>
-              <a:t>2024-06-10</a:t>
+              <a:t>2024-06-12</a:t>
             </a:fld>
             <a:endParaRPr lang="ko-KR" altLang="en-US"/>
           </a:p>
@@ -860,7 +867,7 @@
           <a:p>
             <a:fld id="{CBBE7988-A085-420D-9970-887AD34DCC02}" type="datetimeFigureOut">
               <a:rPr lang="ko-KR" altLang="en-US" smtClean="0"/>
-              <a:t>2024-06-10</a:t>
+              <a:t>2024-06-12</a:t>
             </a:fld>
             <a:endParaRPr lang="ko-KR" altLang="en-US"/>
           </a:p>
@@ -1135,7 +1142,7 @@
           <a:p>
             <a:fld id="{CBBE7988-A085-420D-9970-887AD34DCC02}" type="datetimeFigureOut">
               <a:rPr lang="ko-KR" altLang="en-US" smtClean="0"/>
-              <a:t>2024-06-10</a:t>
+              <a:t>2024-06-12</a:t>
             </a:fld>
             <a:endParaRPr lang="ko-KR" altLang="en-US"/>
           </a:p>
@@ -1400,7 +1407,7 @@
           <a:p>
             <a:fld id="{CBBE7988-A085-420D-9970-887AD34DCC02}" type="datetimeFigureOut">
               <a:rPr lang="ko-KR" altLang="en-US" smtClean="0"/>
-              <a:t>2024-06-10</a:t>
+              <a:t>2024-06-12</a:t>
             </a:fld>
             <a:endParaRPr lang="ko-KR" altLang="en-US"/>
           </a:p>
@@ -1812,7 +1819,7 @@
           <a:p>
             <a:fld id="{CBBE7988-A085-420D-9970-887AD34DCC02}" type="datetimeFigureOut">
               <a:rPr lang="ko-KR" altLang="en-US" smtClean="0"/>
-              <a:t>2024-06-10</a:t>
+              <a:t>2024-06-12</a:t>
             </a:fld>
             <a:endParaRPr lang="ko-KR" altLang="en-US"/>
           </a:p>
@@ -1953,7 +1960,7 @@
           <a:p>
             <a:fld id="{CBBE7988-A085-420D-9970-887AD34DCC02}" type="datetimeFigureOut">
               <a:rPr lang="ko-KR" altLang="en-US" smtClean="0"/>
-              <a:t>2024-06-10</a:t>
+              <a:t>2024-06-12</a:t>
             </a:fld>
             <a:endParaRPr lang="ko-KR" altLang="en-US"/>
           </a:p>
@@ -2066,7 +2073,7 @@
           <a:p>
             <a:fld id="{CBBE7988-A085-420D-9970-887AD34DCC02}" type="datetimeFigureOut">
               <a:rPr lang="ko-KR" altLang="en-US" smtClean="0"/>
-              <a:t>2024-06-10</a:t>
+              <a:t>2024-06-12</a:t>
             </a:fld>
             <a:endParaRPr lang="ko-KR" altLang="en-US"/>
           </a:p>
@@ -2377,7 +2384,7 @@
           <a:p>
             <a:fld id="{CBBE7988-A085-420D-9970-887AD34DCC02}" type="datetimeFigureOut">
               <a:rPr lang="ko-KR" altLang="en-US" smtClean="0"/>
-              <a:t>2024-06-10</a:t>
+              <a:t>2024-06-12</a:t>
             </a:fld>
             <a:endParaRPr lang="ko-KR" altLang="en-US"/>
           </a:p>
@@ -2665,7 +2672,7 @@
           <a:p>
             <a:fld id="{CBBE7988-A085-420D-9970-887AD34DCC02}" type="datetimeFigureOut">
               <a:rPr lang="ko-KR" altLang="en-US" smtClean="0"/>
-              <a:t>2024-06-10</a:t>
+              <a:t>2024-06-12</a:t>
             </a:fld>
             <a:endParaRPr lang="ko-KR" altLang="en-US"/>
           </a:p>
@@ -2906,7 +2913,7 @@
           <a:p>
             <a:fld id="{CBBE7988-A085-420D-9970-887AD34DCC02}" type="datetimeFigureOut">
               <a:rPr lang="ko-KR" altLang="en-US" smtClean="0"/>
-              <a:t>2024-06-10</a:t>
+              <a:t>2024-06-12</a:t>
             </a:fld>
             <a:endParaRPr lang="ko-KR" altLang="en-US"/>
           </a:p>
@@ -3352,18 +3359,17 @@
           <a:lstStyle/>
           <a:p>
             <a:r>
+              <a:rPr lang="ko-KR" altLang="en-US" sz="5400" dirty="0"/>
+              <a:t>포탈</a:t>
+            </a:r>
+            <a:r>
               <a:rPr lang="en-US" altLang="ko-KR" sz="5400" dirty="0"/>
-              <a:t>Portal</a:t>
+              <a:t>2 </a:t>
             </a:r>
             <a:r>
               <a:rPr lang="ko-KR" altLang="en-US" sz="5400" dirty="0"/>
-              <a:t> </a:t>
-            </a:r>
-            <a:r>
-              <a:rPr lang="en-US" altLang="ko-KR" sz="5400" dirty="0"/>
-              <a:t>Concept Game Dev</a:t>
-            </a:r>
-            <a:endParaRPr lang="ko-KR" altLang="en-US" sz="5400" dirty="0"/>
+              <a:t>모작 개발</a:t>
+            </a:r>
           </a:p>
         </p:txBody>
       </p:sp>
@@ -3426,96 +3432,47 @@
           <a:chExt cx="0" cy="0"/>
         </a:xfrm>
       </p:grpSpPr>
-      <p:pic>
-        <p:nvPicPr>
-          <p:cNvPr id="1026" name="Picture 2" descr="Portal 2 Review - Gamereactor">
-            <a:extLst>
-              <a:ext uri="{FF2B5EF4-FFF2-40B4-BE49-F238E27FC236}">
-                <a16:creationId xmlns:a16="http://schemas.microsoft.com/office/drawing/2014/main" id="{F58FFC5C-30B5-46D6-9990-E40531DFA89D}"/>
-              </a:ext>
-            </a:extLst>
-          </p:cNvPr>
-          <p:cNvPicPr>
-            <a:picLocks noChangeAspect="1" noChangeArrowheads="1"/>
-          </p:cNvPicPr>
+      <p:sp>
+        <p:nvSpPr>
+          <p:cNvPr id="4" name="직사각형 3">
+            <a:extLst>
+              <a:ext uri="{FF2B5EF4-FFF2-40B4-BE49-F238E27FC236}">
+                <a16:creationId xmlns:a16="http://schemas.microsoft.com/office/drawing/2014/main" id="{C05D4DE0-133C-4C36-AE41-FF995ABFE18E}"/>
+              </a:ext>
+            </a:extLst>
+          </p:cNvPr>
+          <p:cNvSpPr/>
           <p:nvPr/>
-        </p:nvPicPr>
-        <p:blipFill>
-          <a:blip r:embed="rId2">
-            <a:extLst>
-              <a:ext uri="{28A0092B-C50C-407E-A947-70E740481C1C}">
-                <a14:useLocalDpi xmlns:a14="http://schemas.microsoft.com/office/drawing/2010/main" val="0"/>
-              </a:ext>
-            </a:extLst>
-          </a:blip>
-          <a:srcRect/>
-          <a:stretch>
-            <a:fillRect/>
-          </a:stretch>
-        </p:blipFill>
-        <p:spPr bwMode="auto">
+        </p:nvSpPr>
+        <p:spPr>
           <a:xfrm>
-            <a:off x="2539766" y="1206354"/>
-            <a:ext cx="7112467" cy="4445292"/>
+            <a:off x="3184016" y="3244334"/>
+            <a:ext cx="5823967" cy="369332"/>
           </a:xfrm>
           <a:prstGeom prst="rect">
             <a:avLst/>
           </a:prstGeom>
-          <a:noFill/>
-          <a:extLst>
-            <a:ext uri="{909E8E84-426E-40DD-AFC4-6F175D3DCCD1}">
-              <a14:hiddenFill xmlns:a14="http://schemas.microsoft.com/office/drawing/2010/main">
-                <a:solidFill>
-                  <a:srgbClr val="FFFFFF"/>
-                </a:solidFill>
-              </a14:hiddenFill>
-            </a:ext>
-          </a:extLst>
         </p:spPr>
-      </p:pic>
-      <p:sp>
-        <p:nvSpPr>
-          <p:cNvPr id="4" name="TextBox 3">
-            <a:extLst>
-              <a:ext uri="{FF2B5EF4-FFF2-40B4-BE49-F238E27FC236}">
-                <a16:creationId xmlns:a16="http://schemas.microsoft.com/office/drawing/2014/main" id="{E6CF69E4-5811-478C-913E-A5F4203CBE8D}"/>
-              </a:ext>
-            </a:extLst>
-          </p:cNvPr>
-          <p:cNvSpPr txBox="1"/>
-          <p:nvPr/>
-        </p:nvSpPr>
-        <p:spPr>
-          <a:xfrm>
-            <a:off x="721452" y="612396"/>
-            <a:ext cx="2172749" cy="369332"/>
-          </a:xfrm>
-          <a:prstGeom prst="rect">
-            <a:avLst/>
-          </a:prstGeom>
-          <a:noFill/>
-        </p:spPr>
-        <p:txBody>
-          <a:bodyPr wrap="square" rtlCol="0">
+        <p:txBody>
+          <a:bodyPr wrap="none">
             <a:spAutoFit/>
           </a:bodyPr>
           <a:lstStyle/>
           <a:p>
             <a:r>
-              <a:rPr lang="en-US" altLang="ko-KR" dirty="0"/>
-              <a:t>Fps camera </a:t>
-            </a:r>
-            <a:r>
-              <a:rPr lang="ko-KR" altLang="en-US" dirty="0"/>
-              <a:t>스타일</a:t>
-            </a:r>
+              <a:rPr lang="ko-KR" altLang="en-US" dirty="0">
+                <a:hlinkClick r:id="rId2"/>
+              </a:rPr>
+              <a:t>https://youtu.be/KCYr5pFC6Sw?si=A2qLvAna4d-UsT6B</a:t>
+            </a:r>
+            <a:endParaRPr lang="ko-KR" altLang="en-US" dirty="0"/>
           </a:p>
         </p:txBody>
       </p:sp>
     </p:spTree>
     <p:extLst>
       <p:ext uri="{BB962C8B-B14F-4D97-AF65-F5344CB8AC3E}">
-        <p14:creationId xmlns:p14="http://schemas.microsoft.com/office/powerpoint/2010/main" val="4144520311"/>
+        <p14:creationId xmlns:p14="http://schemas.microsoft.com/office/powerpoint/2010/main" val="68536424"/>
       </p:ext>
     </p:extLst>
   </p:cSld>
@@ -3544,6 +3501,122 @@
       </p:grpSpPr>
       <p:pic>
         <p:nvPicPr>
+          <p:cNvPr id="1026" name="Picture 2" descr="Portal 2 Review - Gamereactor">
+            <a:extLst>
+              <a:ext uri="{FF2B5EF4-FFF2-40B4-BE49-F238E27FC236}">
+                <a16:creationId xmlns:a16="http://schemas.microsoft.com/office/drawing/2014/main" id="{F58FFC5C-30B5-46D6-9990-E40531DFA89D}"/>
+              </a:ext>
+            </a:extLst>
+          </p:cNvPr>
+          <p:cNvPicPr>
+            <a:picLocks noChangeAspect="1" noChangeArrowheads="1"/>
+          </p:cNvPicPr>
+          <p:nvPr/>
+        </p:nvPicPr>
+        <p:blipFill>
+          <a:blip r:embed="rId2">
+            <a:extLst>
+              <a:ext uri="{28A0092B-C50C-407E-A947-70E740481C1C}">
+                <a14:useLocalDpi xmlns:a14="http://schemas.microsoft.com/office/drawing/2010/main" val="0"/>
+              </a:ext>
+            </a:extLst>
+          </a:blip>
+          <a:srcRect/>
+          <a:stretch>
+            <a:fillRect/>
+          </a:stretch>
+        </p:blipFill>
+        <p:spPr bwMode="auto">
+          <a:xfrm>
+            <a:off x="2539766" y="1206354"/>
+            <a:ext cx="7112467" cy="4445292"/>
+          </a:xfrm>
+          <a:prstGeom prst="rect">
+            <a:avLst/>
+          </a:prstGeom>
+          <a:noFill/>
+          <a:extLst>
+            <a:ext uri="{909E8E84-426E-40DD-AFC4-6F175D3DCCD1}">
+              <a14:hiddenFill xmlns:a14="http://schemas.microsoft.com/office/drawing/2010/main">
+                <a:solidFill>
+                  <a:srgbClr val="FFFFFF"/>
+                </a:solidFill>
+              </a14:hiddenFill>
+            </a:ext>
+          </a:extLst>
+        </p:spPr>
+      </p:pic>
+      <p:sp>
+        <p:nvSpPr>
+          <p:cNvPr id="4" name="TextBox 3">
+            <a:extLst>
+              <a:ext uri="{FF2B5EF4-FFF2-40B4-BE49-F238E27FC236}">
+                <a16:creationId xmlns:a16="http://schemas.microsoft.com/office/drawing/2014/main" id="{E6CF69E4-5811-478C-913E-A5F4203CBE8D}"/>
+              </a:ext>
+            </a:extLst>
+          </p:cNvPr>
+          <p:cNvSpPr txBox="1"/>
+          <p:nvPr/>
+        </p:nvSpPr>
+        <p:spPr>
+          <a:xfrm>
+            <a:off x="721452" y="612396"/>
+            <a:ext cx="2172749" cy="369332"/>
+          </a:xfrm>
+          <a:prstGeom prst="rect">
+            <a:avLst/>
+          </a:prstGeom>
+          <a:noFill/>
+        </p:spPr>
+        <p:txBody>
+          <a:bodyPr wrap="square" rtlCol="0">
+            <a:spAutoFit/>
+          </a:bodyPr>
+          <a:lstStyle/>
+          <a:p>
+            <a:r>
+              <a:rPr lang="en-US" altLang="ko-KR" dirty="0"/>
+              <a:t>Fps camera </a:t>
+            </a:r>
+            <a:r>
+              <a:rPr lang="ko-KR" altLang="en-US" dirty="0"/>
+              <a:t>스타일</a:t>
+            </a:r>
+          </a:p>
+        </p:txBody>
+      </p:sp>
+    </p:spTree>
+    <p:extLst>
+      <p:ext uri="{BB962C8B-B14F-4D97-AF65-F5344CB8AC3E}">
+        <p14:creationId xmlns:p14="http://schemas.microsoft.com/office/powerpoint/2010/main" val="4144520311"/>
+      </p:ext>
+    </p:extLst>
+  </p:cSld>
+  <p:clrMapOvr>
+    <a:masterClrMapping/>
+  </p:clrMapOvr>
+</p:sld>
+</file>
+
+<file path=ppt/slides/slide4.xml><?xml version="1.0" encoding="utf-8"?>
+<p:sld xmlns:a="http://schemas.openxmlformats.org/drawingml/2006/main" xmlns:r="http://schemas.openxmlformats.org/officeDocument/2006/relationships" xmlns:p="http://schemas.openxmlformats.org/presentationml/2006/main">
+  <p:cSld>
+    <p:spTree>
+      <p:nvGrpSpPr>
+        <p:cNvPr id="1" name=""/>
+        <p:cNvGrpSpPr/>
+        <p:nvPr/>
+      </p:nvGrpSpPr>
+      <p:grpSpPr>
+        <a:xfrm>
+          <a:off x="0" y="0"/>
+          <a:ext cx="0" cy="0"/>
+          <a:chOff x="0" y="0"/>
+          <a:chExt cx="0" cy="0"/>
+        </a:xfrm>
+      </p:grpSpPr>
+      <p:pic>
+        <p:nvPicPr>
           <p:cNvPr id="2050" name="Picture 2" descr="Portals - Portal Wiki">
             <a:extLst>
               <a:ext uri="{FF2B5EF4-FFF2-40B4-BE49-F238E27FC236}">
@@ -3589,10 +3662,745 @@
           </a:extLst>
         </p:spPr>
       </p:pic>
+      <p:pic>
+        <p:nvPicPr>
+          <p:cNvPr id="2" name="그림 1">
+            <a:extLst>
+              <a:ext uri="{FF2B5EF4-FFF2-40B4-BE49-F238E27FC236}">
+                <a16:creationId xmlns:a16="http://schemas.microsoft.com/office/drawing/2014/main" id="{22E43BF7-B282-46E9-95F0-42A36C7E06D8}"/>
+              </a:ext>
+            </a:extLst>
+          </p:cNvPr>
+          <p:cNvPicPr>
+            <a:picLocks noChangeAspect="1"/>
+          </p:cNvPicPr>
+          <p:nvPr/>
+        </p:nvPicPr>
+        <p:blipFill>
+          <a:blip r:embed="rId3"/>
+          <a:stretch>
+            <a:fillRect/>
+          </a:stretch>
+        </p:blipFill>
+        <p:spPr>
+          <a:xfrm>
+            <a:off x="3242810" y="1921079"/>
+            <a:ext cx="7464338" cy="4198690"/>
+          </a:xfrm>
+          <a:prstGeom prst="rect">
+            <a:avLst/>
+          </a:prstGeom>
+        </p:spPr>
+      </p:pic>
+      <p:sp>
+        <p:nvSpPr>
+          <p:cNvPr id="7" name="TextBox 6">
+            <a:extLst>
+              <a:ext uri="{FF2B5EF4-FFF2-40B4-BE49-F238E27FC236}">
+                <a16:creationId xmlns:a16="http://schemas.microsoft.com/office/drawing/2014/main" id="{B8E70807-DF0A-4B5D-9488-F2B33A896880}"/>
+              </a:ext>
+            </a:extLst>
+          </p:cNvPr>
+          <p:cNvSpPr txBox="1"/>
+          <p:nvPr/>
+        </p:nvSpPr>
+        <p:spPr>
+          <a:xfrm>
+            <a:off x="3808602" y="394283"/>
+            <a:ext cx="5315366" cy="369332"/>
+          </a:xfrm>
+          <a:prstGeom prst="rect">
+            <a:avLst/>
+          </a:prstGeom>
+          <a:noFill/>
+        </p:spPr>
+        <p:txBody>
+          <a:bodyPr wrap="none" rtlCol="0">
+            <a:spAutoFit/>
+          </a:bodyPr>
+          <a:lstStyle/>
+          <a:p>
+            <a:r>
+              <a:rPr lang="en-US" altLang="ko-KR" dirty="0">
+                <a:hlinkClick r:id="rId4"/>
+              </a:rPr>
+              <a:t>https://www.youtube.com/watch?v=TkzASwVgnj8</a:t>
+            </a:r>
+            <a:endParaRPr lang="ko-KR" altLang="en-US" dirty="0"/>
+          </a:p>
+        </p:txBody>
+      </p:sp>
     </p:spTree>
     <p:extLst>
       <p:ext uri="{BB962C8B-B14F-4D97-AF65-F5344CB8AC3E}">
         <p14:creationId xmlns:p14="http://schemas.microsoft.com/office/powerpoint/2010/main" val="3908584087"/>
+      </p:ext>
+    </p:extLst>
+  </p:cSld>
+  <p:clrMapOvr>
+    <a:masterClrMapping/>
+  </p:clrMapOvr>
+</p:sld>
+</file>
+
+<file path=ppt/slides/slide5.xml><?xml version="1.0" encoding="utf-8"?>
+<p:sld xmlns:a="http://schemas.openxmlformats.org/drawingml/2006/main" xmlns:r="http://schemas.openxmlformats.org/officeDocument/2006/relationships" xmlns:p="http://schemas.openxmlformats.org/presentationml/2006/main">
+  <p:cSld>
+    <p:spTree>
+      <p:nvGrpSpPr>
+        <p:cNvPr id="1" name=""/>
+        <p:cNvGrpSpPr/>
+        <p:nvPr/>
+      </p:nvGrpSpPr>
+      <p:grpSpPr>
+        <a:xfrm>
+          <a:off x="0" y="0"/>
+          <a:ext cx="0" cy="0"/>
+          <a:chOff x="0" y="0"/>
+          <a:chExt cx="0" cy="0"/>
+        </a:xfrm>
+      </p:grpSpPr>
+      <p:sp>
+        <p:nvSpPr>
+          <p:cNvPr id="6" name="직사각형 5">
+            <a:extLst>
+              <a:ext uri="{FF2B5EF4-FFF2-40B4-BE49-F238E27FC236}">
+                <a16:creationId xmlns:a16="http://schemas.microsoft.com/office/drawing/2014/main" id="{076C22E0-534C-4505-B2E1-2CD4EFE06281}"/>
+              </a:ext>
+            </a:extLst>
+          </p:cNvPr>
+          <p:cNvSpPr/>
+          <p:nvPr/>
+        </p:nvSpPr>
+        <p:spPr>
+          <a:xfrm>
+            <a:off x="654341" y="931395"/>
+            <a:ext cx="2617366" cy="570451"/>
+          </a:xfrm>
+          <a:prstGeom prst="rect">
+            <a:avLst/>
+          </a:prstGeom>
+          <a:solidFill>
+            <a:schemeClr val="bg1"/>
+          </a:solidFill>
+        </p:spPr>
+        <p:style>
+          <a:lnRef idx="2">
+            <a:schemeClr val="accent1">
+              <a:shade val="50000"/>
+            </a:schemeClr>
+          </a:lnRef>
+          <a:fillRef idx="1">
+            <a:schemeClr val="accent1"/>
+          </a:fillRef>
+          <a:effectRef idx="0">
+            <a:schemeClr val="accent1"/>
+          </a:effectRef>
+          <a:fontRef idx="minor">
+            <a:schemeClr val="lt1"/>
+          </a:fontRef>
+        </p:style>
+        <p:txBody>
+          <a:bodyPr rtlCol="0" anchor="ctr"/>
+          <a:lstStyle/>
+          <a:p>
+            <a:pPr algn="ctr"/>
+            <a:r>
+              <a:rPr lang="ko-KR" altLang="en-US" dirty="0">
+                <a:solidFill>
+                  <a:schemeClr val="tx1"/>
+                </a:solidFill>
+              </a:rPr>
+              <a:t>플레이어 이동 코드</a:t>
+            </a:r>
+          </a:p>
+        </p:txBody>
+      </p:sp>
+      <p:sp>
+        <p:nvSpPr>
+          <p:cNvPr id="14" name="직사각형 13">
+            <a:extLst>
+              <a:ext uri="{FF2B5EF4-FFF2-40B4-BE49-F238E27FC236}">
+                <a16:creationId xmlns:a16="http://schemas.microsoft.com/office/drawing/2014/main" id="{88459A3F-A991-46A5-9448-04B47DC3FA46}"/>
+              </a:ext>
+            </a:extLst>
+          </p:cNvPr>
+          <p:cNvSpPr/>
+          <p:nvPr/>
+        </p:nvSpPr>
+        <p:spPr>
+          <a:xfrm>
+            <a:off x="654341" y="1721359"/>
+            <a:ext cx="2617366" cy="570451"/>
+          </a:xfrm>
+          <a:prstGeom prst="rect">
+            <a:avLst/>
+          </a:prstGeom>
+          <a:solidFill>
+            <a:schemeClr val="bg1"/>
+          </a:solidFill>
+        </p:spPr>
+        <p:style>
+          <a:lnRef idx="2">
+            <a:schemeClr val="accent1">
+              <a:shade val="50000"/>
+            </a:schemeClr>
+          </a:lnRef>
+          <a:fillRef idx="1">
+            <a:schemeClr val="accent1"/>
+          </a:fillRef>
+          <a:effectRef idx="0">
+            <a:schemeClr val="accent1"/>
+          </a:effectRef>
+          <a:fontRef idx="minor">
+            <a:schemeClr val="lt1"/>
+          </a:fontRef>
+        </p:style>
+        <p:txBody>
+          <a:bodyPr rtlCol="0" anchor="ctr"/>
+          <a:lstStyle/>
+          <a:p>
+            <a:pPr algn="ctr"/>
+            <a:r>
+              <a:rPr lang="en-US" altLang="ko-KR" dirty="0">
+                <a:solidFill>
+                  <a:schemeClr val="tx1"/>
+                </a:solidFill>
+              </a:rPr>
+              <a:t>1</a:t>
+            </a:r>
+            <a:r>
+              <a:rPr lang="ko-KR" altLang="en-US" dirty="0">
+                <a:solidFill>
+                  <a:schemeClr val="tx1"/>
+                </a:solidFill>
+              </a:rPr>
+              <a:t>인칭 카메라 설정</a:t>
+            </a:r>
+          </a:p>
+        </p:txBody>
+      </p:sp>
+      <p:sp>
+        <p:nvSpPr>
+          <p:cNvPr id="17" name="직사각형 16">
+            <a:extLst>
+              <a:ext uri="{FF2B5EF4-FFF2-40B4-BE49-F238E27FC236}">
+                <a16:creationId xmlns:a16="http://schemas.microsoft.com/office/drawing/2014/main" id="{88631D84-284A-4599-A5E4-EBE30A9A5EB7}"/>
+              </a:ext>
+            </a:extLst>
+          </p:cNvPr>
+          <p:cNvSpPr/>
+          <p:nvPr/>
+        </p:nvSpPr>
+        <p:spPr>
+          <a:xfrm>
+            <a:off x="654341" y="2511323"/>
+            <a:ext cx="2617366" cy="570451"/>
+          </a:xfrm>
+          <a:prstGeom prst="rect">
+            <a:avLst/>
+          </a:prstGeom>
+          <a:solidFill>
+            <a:schemeClr val="bg1"/>
+          </a:solidFill>
+        </p:spPr>
+        <p:style>
+          <a:lnRef idx="2">
+            <a:schemeClr val="accent1">
+              <a:shade val="50000"/>
+            </a:schemeClr>
+          </a:lnRef>
+          <a:fillRef idx="1">
+            <a:schemeClr val="accent1"/>
+          </a:fillRef>
+          <a:effectRef idx="0">
+            <a:schemeClr val="accent1"/>
+          </a:effectRef>
+          <a:fontRef idx="minor">
+            <a:schemeClr val="lt1"/>
+          </a:fontRef>
+        </p:style>
+        <p:txBody>
+          <a:bodyPr rtlCol="0" anchor="ctr"/>
+          <a:lstStyle/>
+          <a:p>
+            <a:pPr algn="ctr"/>
+            <a:r>
+              <a:rPr lang="ko-KR" altLang="en-US" dirty="0">
+                <a:solidFill>
+                  <a:schemeClr val="tx1"/>
+                </a:solidFill>
+              </a:rPr>
+              <a:t>총기 부착 </a:t>
+            </a:r>
+            <a:r>
+              <a:rPr lang="en-US" altLang="ko-KR" dirty="0">
+                <a:solidFill>
+                  <a:schemeClr val="tx1"/>
+                </a:solidFill>
+              </a:rPr>
+              <a:t>+ </a:t>
+            </a:r>
+            <a:r>
+              <a:rPr lang="ko-KR" altLang="en-US" dirty="0">
+                <a:solidFill>
+                  <a:schemeClr val="tx1"/>
+                </a:solidFill>
+              </a:rPr>
+              <a:t>발사</a:t>
+            </a:r>
+          </a:p>
+        </p:txBody>
+      </p:sp>
+      <p:sp>
+        <p:nvSpPr>
+          <p:cNvPr id="18" name="직사각형 17">
+            <a:extLst>
+              <a:ext uri="{FF2B5EF4-FFF2-40B4-BE49-F238E27FC236}">
+                <a16:creationId xmlns:a16="http://schemas.microsoft.com/office/drawing/2014/main" id="{DDFB62E0-C3D6-4507-A472-44373CF533EC}"/>
+              </a:ext>
+            </a:extLst>
+          </p:cNvPr>
+          <p:cNvSpPr/>
+          <p:nvPr/>
+        </p:nvSpPr>
+        <p:spPr>
+          <a:xfrm>
+            <a:off x="654341" y="3301287"/>
+            <a:ext cx="2617366" cy="570451"/>
+          </a:xfrm>
+          <a:prstGeom prst="rect">
+            <a:avLst/>
+          </a:prstGeom>
+          <a:solidFill>
+            <a:schemeClr val="bg1"/>
+          </a:solidFill>
+        </p:spPr>
+        <p:style>
+          <a:lnRef idx="2">
+            <a:schemeClr val="accent1">
+              <a:shade val="50000"/>
+            </a:schemeClr>
+          </a:lnRef>
+          <a:fillRef idx="1">
+            <a:schemeClr val="accent1"/>
+          </a:fillRef>
+          <a:effectRef idx="0">
+            <a:schemeClr val="accent1"/>
+          </a:effectRef>
+          <a:fontRef idx="minor">
+            <a:schemeClr val="lt1"/>
+          </a:fontRef>
+        </p:style>
+        <p:txBody>
+          <a:bodyPr rtlCol="0" anchor="ctr"/>
+          <a:lstStyle/>
+          <a:p>
+            <a:pPr algn="ctr"/>
+            <a:r>
+              <a:rPr lang="ko-KR" altLang="en-US" dirty="0">
+                <a:solidFill>
+                  <a:schemeClr val="tx1"/>
+                </a:solidFill>
+              </a:rPr>
+              <a:t>포탈 로직 구현</a:t>
+            </a:r>
+          </a:p>
+        </p:txBody>
+      </p:sp>
+      <p:sp>
+        <p:nvSpPr>
+          <p:cNvPr id="19" name="직사각형 18">
+            <a:extLst>
+              <a:ext uri="{FF2B5EF4-FFF2-40B4-BE49-F238E27FC236}">
+                <a16:creationId xmlns:a16="http://schemas.microsoft.com/office/drawing/2014/main" id="{81592983-4CC7-40A3-809E-D08706C37FAE}"/>
+              </a:ext>
+            </a:extLst>
+          </p:cNvPr>
+          <p:cNvSpPr/>
+          <p:nvPr/>
+        </p:nvSpPr>
+        <p:spPr>
+          <a:xfrm>
+            <a:off x="654341" y="4091251"/>
+            <a:ext cx="2617366" cy="570451"/>
+          </a:xfrm>
+          <a:prstGeom prst="rect">
+            <a:avLst/>
+          </a:prstGeom>
+          <a:solidFill>
+            <a:schemeClr val="bg1"/>
+          </a:solidFill>
+        </p:spPr>
+        <p:style>
+          <a:lnRef idx="2">
+            <a:schemeClr val="accent1">
+              <a:shade val="50000"/>
+            </a:schemeClr>
+          </a:lnRef>
+          <a:fillRef idx="1">
+            <a:schemeClr val="accent1"/>
+          </a:fillRef>
+          <a:effectRef idx="0">
+            <a:schemeClr val="accent1"/>
+          </a:effectRef>
+          <a:fontRef idx="minor">
+            <a:schemeClr val="lt1"/>
+          </a:fontRef>
+        </p:style>
+        <p:txBody>
+          <a:bodyPr rtlCol="0" anchor="ctr"/>
+          <a:lstStyle/>
+          <a:p>
+            <a:pPr algn="ctr"/>
+            <a:r>
+              <a:rPr lang="ko-KR" altLang="en-US" dirty="0">
+                <a:solidFill>
+                  <a:schemeClr val="tx1"/>
+                </a:solidFill>
+              </a:rPr>
+              <a:t>적 구현</a:t>
+            </a:r>
+          </a:p>
+        </p:txBody>
+      </p:sp>
+      <p:sp>
+        <p:nvSpPr>
+          <p:cNvPr id="20" name="직사각형 19">
+            <a:extLst>
+              <a:ext uri="{FF2B5EF4-FFF2-40B4-BE49-F238E27FC236}">
+                <a16:creationId xmlns:a16="http://schemas.microsoft.com/office/drawing/2014/main" id="{6B6C1CF6-63E6-44BA-BD05-247E52F8F57C}"/>
+              </a:ext>
+            </a:extLst>
+          </p:cNvPr>
+          <p:cNvSpPr/>
+          <p:nvPr/>
+        </p:nvSpPr>
+        <p:spPr>
+          <a:xfrm>
+            <a:off x="654341" y="4881215"/>
+            <a:ext cx="2617366" cy="570451"/>
+          </a:xfrm>
+          <a:prstGeom prst="rect">
+            <a:avLst/>
+          </a:prstGeom>
+          <a:solidFill>
+            <a:schemeClr val="bg1"/>
+          </a:solidFill>
+        </p:spPr>
+        <p:style>
+          <a:lnRef idx="2">
+            <a:schemeClr val="accent1">
+              <a:shade val="50000"/>
+            </a:schemeClr>
+          </a:lnRef>
+          <a:fillRef idx="1">
+            <a:schemeClr val="accent1"/>
+          </a:fillRef>
+          <a:effectRef idx="0">
+            <a:schemeClr val="accent1"/>
+          </a:effectRef>
+          <a:fontRef idx="minor">
+            <a:schemeClr val="lt1"/>
+          </a:fontRef>
+        </p:style>
+        <p:txBody>
+          <a:bodyPr rtlCol="0" anchor="ctr"/>
+          <a:lstStyle/>
+          <a:p>
+            <a:pPr algn="ctr"/>
+            <a:r>
+              <a:rPr lang="ko-KR" altLang="en-US" dirty="0">
+                <a:solidFill>
+                  <a:schemeClr val="tx1"/>
+                </a:solidFill>
+              </a:rPr>
+              <a:t>맵 구현</a:t>
+            </a:r>
+          </a:p>
+        </p:txBody>
+      </p:sp>
+      <p:sp>
+        <p:nvSpPr>
+          <p:cNvPr id="23" name="TextBox 22">
+            <a:extLst>
+              <a:ext uri="{FF2B5EF4-FFF2-40B4-BE49-F238E27FC236}">
+                <a16:creationId xmlns:a16="http://schemas.microsoft.com/office/drawing/2014/main" id="{67019216-C040-4C8E-9CBB-A14F6CE7D2AD}"/>
+              </a:ext>
+            </a:extLst>
+          </p:cNvPr>
+          <p:cNvSpPr txBox="1"/>
+          <p:nvPr/>
+        </p:nvSpPr>
+        <p:spPr>
+          <a:xfrm>
+            <a:off x="3624044" y="2511323"/>
+            <a:ext cx="3092513" cy="461665"/>
+          </a:xfrm>
+          <a:prstGeom prst="rect">
+            <a:avLst/>
+          </a:prstGeom>
+          <a:noFill/>
+        </p:spPr>
+        <p:txBody>
+          <a:bodyPr wrap="none" rtlCol="0">
+            <a:spAutoFit/>
+          </a:bodyPr>
+          <a:lstStyle/>
+          <a:p>
+            <a:pPr marL="171450" indent="-171450">
+              <a:buFontTx/>
+              <a:buChar char="-"/>
+            </a:pPr>
+            <a:r>
+              <a:rPr lang="ko-KR" altLang="en-US" sz="1200" dirty="0"/>
+              <a:t>플레이어 뼈대에 맞게끔 총기 위치 조정</a:t>
+            </a:r>
+            <a:endParaRPr lang="en-US" altLang="ko-KR" sz="1200" dirty="0"/>
+          </a:p>
+          <a:p>
+            <a:pPr marL="171450" indent="-171450">
+              <a:buFontTx/>
+              <a:buChar char="-"/>
+            </a:pPr>
+            <a:r>
+              <a:rPr lang="en-US" altLang="ko-KR" sz="1200" dirty="0"/>
+              <a:t>1</a:t>
+            </a:r>
+            <a:r>
+              <a:rPr lang="ko-KR" altLang="en-US" sz="1200" dirty="0"/>
+              <a:t>인칭 시야에서 보이는 총 조정</a:t>
+            </a:r>
+          </a:p>
+        </p:txBody>
+      </p:sp>
+      <p:sp>
+        <p:nvSpPr>
+          <p:cNvPr id="24" name="TextBox 23">
+            <a:extLst>
+              <a:ext uri="{FF2B5EF4-FFF2-40B4-BE49-F238E27FC236}">
+                <a16:creationId xmlns:a16="http://schemas.microsoft.com/office/drawing/2014/main" id="{A9FFC9B3-9C4D-407B-9F46-A73021224E2F}"/>
+              </a:ext>
+            </a:extLst>
+          </p:cNvPr>
+          <p:cNvSpPr txBox="1"/>
+          <p:nvPr/>
+        </p:nvSpPr>
+        <p:spPr>
+          <a:xfrm>
+            <a:off x="3624044" y="3301287"/>
+            <a:ext cx="4868640" cy="461665"/>
+          </a:xfrm>
+          <a:prstGeom prst="rect">
+            <a:avLst/>
+          </a:prstGeom>
+          <a:noFill/>
+        </p:spPr>
+        <p:txBody>
+          <a:bodyPr wrap="none" rtlCol="0">
+            <a:spAutoFit/>
+          </a:bodyPr>
+          <a:lstStyle/>
+          <a:p>
+            <a:pPr marL="171450" indent="-171450">
+              <a:buFontTx/>
+              <a:buChar char="-"/>
+            </a:pPr>
+            <a:r>
+              <a:rPr lang="ko-KR" altLang="en-US" sz="1200" dirty="0"/>
+              <a:t>장전</a:t>
+            </a:r>
+            <a:r>
+              <a:rPr lang="en-US" altLang="ko-KR" sz="1200" dirty="0"/>
+              <a:t> x, </a:t>
+            </a:r>
+            <a:r>
+              <a:rPr lang="ko-KR" altLang="en-US" sz="1200" dirty="0"/>
+              <a:t>포탈 </a:t>
+            </a:r>
+            <a:r>
+              <a:rPr lang="en-US" altLang="ko-KR" sz="1200" dirty="0"/>
+              <a:t>(1</a:t>
+            </a:r>
+            <a:r>
+              <a:rPr lang="ko-KR" altLang="en-US" sz="1200" dirty="0"/>
+              <a:t>번</a:t>
+            </a:r>
+            <a:r>
+              <a:rPr lang="en-US" altLang="ko-KR" sz="1200" dirty="0"/>
+              <a:t>,2</a:t>
+            </a:r>
+            <a:r>
+              <a:rPr lang="ko-KR" altLang="en-US" sz="1200" dirty="0"/>
+              <a:t>번</a:t>
+            </a:r>
+            <a:r>
+              <a:rPr lang="en-US" altLang="ko-KR" sz="1200" dirty="0"/>
+              <a:t>) 2</a:t>
+            </a:r>
+            <a:r>
+              <a:rPr lang="ko-KR" altLang="en-US" sz="1200" dirty="0"/>
+              <a:t>번까지 쏘고 재사용 시 </a:t>
+            </a:r>
+            <a:r>
+              <a:rPr lang="en-US" altLang="ko-KR" sz="1200" dirty="0"/>
+              <a:t>1</a:t>
+            </a:r>
+            <a:r>
+              <a:rPr lang="ko-KR" altLang="en-US" sz="1200" dirty="0"/>
+              <a:t>번 소멸 </a:t>
+            </a:r>
+            <a:r>
+              <a:rPr lang="en-US" altLang="ko-KR" sz="1200" dirty="0"/>
+              <a:t>+ </a:t>
+            </a:r>
+            <a:r>
+              <a:rPr lang="ko-KR" altLang="en-US" sz="1200" dirty="0"/>
+              <a:t>재생성</a:t>
+            </a:r>
+            <a:endParaRPr lang="en-US" altLang="ko-KR" sz="1200" dirty="0"/>
+          </a:p>
+          <a:p>
+            <a:pPr marL="171450" indent="-171450">
+              <a:buFontTx/>
+              <a:buChar char="-"/>
+            </a:pPr>
+            <a:r>
+              <a:rPr lang="ko-KR" altLang="en-US" sz="1200" dirty="0" err="1"/>
+              <a:t>ㅇ</a:t>
+            </a:r>
+            <a:endParaRPr lang="ko-KR" altLang="en-US" sz="1200" dirty="0"/>
+          </a:p>
+        </p:txBody>
+      </p:sp>
+      <p:sp>
+        <p:nvSpPr>
+          <p:cNvPr id="25" name="TextBox 24">
+            <a:extLst>
+              <a:ext uri="{FF2B5EF4-FFF2-40B4-BE49-F238E27FC236}">
+                <a16:creationId xmlns:a16="http://schemas.microsoft.com/office/drawing/2014/main" id="{3097725C-933F-4E2D-B4E0-8171B06994AF}"/>
+              </a:ext>
+            </a:extLst>
+          </p:cNvPr>
+          <p:cNvSpPr txBox="1"/>
+          <p:nvPr/>
+        </p:nvSpPr>
+        <p:spPr>
+          <a:xfrm>
+            <a:off x="3624044" y="4145643"/>
+            <a:ext cx="1478290" cy="276999"/>
+          </a:xfrm>
+          <a:prstGeom prst="rect">
+            <a:avLst/>
+          </a:prstGeom>
+          <a:noFill/>
+        </p:spPr>
+        <p:txBody>
+          <a:bodyPr wrap="none" rtlCol="0">
+            <a:spAutoFit/>
+          </a:bodyPr>
+          <a:lstStyle/>
+          <a:p>
+            <a:pPr marL="171450" indent="-171450">
+              <a:buFontTx/>
+              <a:buChar char="-"/>
+            </a:pPr>
+            <a:r>
+              <a:rPr lang="ko-KR" altLang="en-US" sz="1200" dirty="0"/>
+              <a:t>레이저 쏘는 적</a:t>
+            </a:r>
+            <a:r>
+              <a:rPr lang="en-US" altLang="ko-KR" sz="1200" dirty="0"/>
+              <a:t>, </a:t>
+            </a:r>
+            <a:endParaRPr lang="ko-KR" altLang="en-US" sz="1200" dirty="0"/>
+          </a:p>
+        </p:txBody>
+      </p:sp>
+      <p:sp>
+        <p:nvSpPr>
+          <p:cNvPr id="26" name="TextBox 25">
+            <a:extLst>
+              <a:ext uri="{FF2B5EF4-FFF2-40B4-BE49-F238E27FC236}">
+                <a16:creationId xmlns:a16="http://schemas.microsoft.com/office/drawing/2014/main" id="{1896469E-79AB-45D7-9112-076251124E2F}"/>
+              </a:ext>
+            </a:extLst>
+          </p:cNvPr>
+          <p:cNvSpPr txBox="1"/>
+          <p:nvPr/>
+        </p:nvSpPr>
+        <p:spPr>
+          <a:xfrm>
+            <a:off x="3624043" y="1721359"/>
+            <a:ext cx="665567" cy="276999"/>
+          </a:xfrm>
+          <a:prstGeom prst="rect">
+            <a:avLst/>
+          </a:prstGeom>
+          <a:noFill/>
+        </p:spPr>
+        <p:txBody>
+          <a:bodyPr wrap="none" rtlCol="0">
+            <a:spAutoFit/>
+          </a:bodyPr>
+          <a:lstStyle/>
+          <a:p>
+            <a:pPr marL="171450" indent="-171450">
+              <a:buFontTx/>
+              <a:buChar char="-"/>
+            </a:pPr>
+            <a:r>
+              <a:rPr lang="ko-KR" altLang="en-US" sz="1200" dirty="0" err="1"/>
+              <a:t>ㅇㅇ</a:t>
+            </a:r>
+            <a:endParaRPr lang="ko-KR" altLang="en-US" sz="1200" dirty="0"/>
+          </a:p>
+        </p:txBody>
+      </p:sp>
+      <p:sp>
+        <p:nvSpPr>
+          <p:cNvPr id="27" name="TextBox 26">
+            <a:extLst>
+              <a:ext uri="{FF2B5EF4-FFF2-40B4-BE49-F238E27FC236}">
+                <a16:creationId xmlns:a16="http://schemas.microsoft.com/office/drawing/2014/main" id="{4123E083-697F-4A54-B8B0-6C9692B83D5E}"/>
+              </a:ext>
+            </a:extLst>
+          </p:cNvPr>
+          <p:cNvSpPr txBox="1"/>
+          <p:nvPr/>
+        </p:nvSpPr>
+        <p:spPr>
+          <a:xfrm>
+            <a:off x="3624044" y="931395"/>
+            <a:ext cx="665567" cy="276999"/>
+          </a:xfrm>
+          <a:prstGeom prst="rect">
+            <a:avLst/>
+          </a:prstGeom>
+          <a:noFill/>
+        </p:spPr>
+        <p:txBody>
+          <a:bodyPr wrap="none" rtlCol="0">
+            <a:spAutoFit/>
+          </a:bodyPr>
+          <a:lstStyle/>
+          <a:p>
+            <a:pPr marL="171450" indent="-171450">
+              <a:buFontTx/>
+              <a:buChar char="-"/>
+            </a:pPr>
+            <a:r>
+              <a:rPr lang="ko-KR" altLang="en-US" sz="1200" dirty="0" err="1"/>
+              <a:t>ㅇㅇ</a:t>
+            </a:r>
+            <a:endParaRPr lang="ko-KR" altLang="en-US" sz="1200" dirty="0"/>
+          </a:p>
+        </p:txBody>
+      </p:sp>
+    </p:spTree>
+    <p:extLst>
+      <p:ext uri="{BB962C8B-B14F-4D97-AF65-F5344CB8AC3E}">
+        <p14:creationId xmlns:p14="http://schemas.microsoft.com/office/powerpoint/2010/main" val="3557975402"/>
       </p:ext>
     </p:extLst>
   </p:cSld>

</xml_diff>